<commit_message>
Add: initial version before review fixes
</commit_message>
<xml_diff>
--- a/presentation_wb.pptx
+++ b/presentation_wb.pptx
@@ -210,7 +210,7 @@
           <a:p>
             <a:fld id="{6EFE7980-753D-4561-B6FA-AF5425BD0CC4}" type="datetimeFigureOut">
               <a:rPr lang="ru-RU" smtClean="0"/>
-              <a:t>29.05.2022</a:t>
+              <a:t>30.05.2022</a:t>
             </a:fld>
             <a:endParaRPr lang="ru-RU"/>
           </a:p>
@@ -624,7 +624,7 @@
           <a:p>
             <a:fld id="{2D595633-FEC6-41B9-B0A1-528C27FD4BC7}" type="datetime1">
               <a:rPr lang="ru-RU" smtClean="0"/>
-              <a:t>29.05.2022</a:t>
+              <a:t>30.05.2022</a:t>
             </a:fld>
             <a:endParaRPr lang="ru-RU"/>
           </a:p>
@@ -822,7 +822,7 @@
           <a:p>
             <a:fld id="{E0B68846-5A7D-494E-A21B-8CE02887DCC5}" type="datetime1">
               <a:rPr lang="ru-RU" smtClean="0"/>
-              <a:t>29.05.2022</a:t>
+              <a:t>30.05.2022</a:t>
             </a:fld>
             <a:endParaRPr lang="ru-RU"/>
           </a:p>
@@ -1030,7 +1030,7 @@
           <a:p>
             <a:fld id="{4781F2F9-03C2-4B05-8C49-879FAD1DC66F}" type="datetime1">
               <a:rPr lang="ru-RU" smtClean="0"/>
-              <a:t>29.05.2022</a:t>
+              <a:t>30.05.2022</a:t>
             </a:fld>
             <a:endParaRPr lang="ru-RU"/>
           </a:p>
@@ -1228,7 +1228,7 @@
           <a:p>
             <a:fld id="{C55CF103-CC98-4CD4-ADC0-0EB50A8E720A}" type="datetime1">
               <a:rPr lang="ru-RU" smtClean="0"/>
-              <a:t>29.05.2022</a:t>
+              <a:t>30.05.2022</a:t>
             </a:fld>
             <a:endParaRPr lang="ru-RU"/>
           </a:p>
@@ -1503,7 +1503,7 @@
           <a:p>
             <a:fld id="{4828CFB2-5362-4BA6-BEE3-BB2642E5F06E}" type="datetime1">
               <a:rPr lang="ru-RU" smtClean="0"/>
-              <a:t>29.05.2022</a:t>
+              <a:t>30.05.2022</a:t>
             </a:fld>
             <a:endParaRPr lang="ru-RU"/>
           </a:p>
@@ -1768,7 +1768,7 @@
           <a:p>
             <a:fld id="{93793127-953A-4FF8-AD25-9A7EAEB5CF5E}" type="datetime1">
               <a:rPr lang="ru-RU" smtClean="0"/>
-              <a:t>29.05.2022</a:t>
+              <a:t>30.05.2022</a:t>
             </a:fld>
             <a:endParaRPr lang="ru-RU"/>
           </a:p>
@@ -2180,7 +2180,7 @@
           <a:p>
             <a:fld id="{7CA2C41C-A390-4D97-B644-81D6A86436D0}" type="datetime1">
               <a:rPr lang="ru-RU" smtClean="0"/>
-              <a:t>29.05.2022</a:t>
+              <a:t>30.05.2022</a:t>
             </a:fld>
             <a:endParaRPr lang="ru-RU"/>
           </a:p>
@@ -2321,7 +2321,7 @@
           <a:p>
             <a:fld id="{01C7CE23-07DC-4D29-AE4F-CF9126D438E0}" type="datetime1">
               <a:rPr lang="ru-RU" smtClean="0"/>
-              <a:t>29.05.2022</a:t>
+              <a:t>30.05.2022</a:t>
             </a:fld>
             <a:endParaRPr lang="ru-RU"/>
           </a:p>
@@ -2434,7 +2434,7 @@
           <a:p>
             <a:fld id="{6416D010-49B1-4964-92ED-287255F37D04}" type="datetime1">
               <a:rPr lang="ru-RU" smtClean="0"/>
-              <a:t>29.05.2022</a:t>
+              <a:t>30.05.2022</a:t>
             </a:fld>
             <a:endParaRPr lang="ru-RU"/>
           </a:p>
@@ -2745,7 +2745,7 @@
           <a:p>
             <a:fld id="{9EB75F55-3DD5-4CE3-9B54-727202BA15E9}" type="datetime1">
               <a:rPr lang="ru-RU" smtClean="0"/>
-              <a:t>29.05.2022</a:t>
+              <a:t>30.05.2022</a:t>
             </a:fld>
             <a:endParaRPr lang="ru-RU"/>
           </a:p>
@@ -3033,7 +3033,7 @@
           <a:p>
             <a:fld id="{C04789F8-F8FE-4256-8AFF-2567DB3965F4}" type="datetime1">
               <a:rPr lang="ru-RU" smtClean="0"/>
-              <a:t>29.05.2022</a:t>
+              <a:t>30.05.2022</a:t>
             </a:fld>
             <a:endParaRPr lang="ru-RU"/>
           </a:p>
@@ -3274,7 +3274,7 @@
           <a:p>
             <a:fld id="{EA3FB417-0F2C-41D5-8173-80D866AD86E5}" type="datetime1">
               <a:rPr lang="ru-RU" smtClean="0"/>
-              <a:t>29.05.2022</a:t>
+              <a:t>30.05.2022</a:t>
             </a:fld>
             <a:endParaRPr lang="ru-RU"/>
           </a:p>
@@ -3949,12 +3949,13 @@
               </a:ext>
             </a:extLst>
           </a:blip>
+          <a:srcRect l="727" t="11274" r="1028" b="28719"/>
           <a:stretch/>
         </p:blipFill>
         <p:spPr>
           <a:xfrm>
-            <a:off x="3282259" y="1825625"/>
-            <a:ext cx="5627481" cy="4351338"/>
+            <a:off x="1209040" y="3225884"/>
+            <a:ext cx="7401560" cy="3495591"/>
           </a:xfrm>
         </p:spPr>
       </p:pic>
@@ -6330,12 +6331,13 @@
               </a:ext>
             </a:extLst>
           </a:blip>
+          <a:srcRect l="351" t="10813" r="892" b="21474"/>
           <a:stretch/>
         </p:blipFill>
         <p:spPr>
           <a:xfrm>
-            <a:off x="3282259" y="1825625"/>
-            <a:ext cx="5627481" cy="4351338"/>
+            <a:off x="1429000" y="1544320"/>
+            <a:ext cx="9333999" cy="4948555"/>
           </a:xfrm>
         </p:spPr>
       </p:pic>

</xml_diff>